<commit_message>
QR code added and link
</commit_message>
<xml_diff>
--- a/files/Exposition_WebDev_James.pptx
+++ b/files/Exposition_WebDev_James.pptx
@@ -207,7 +207,7 @@
           <a:p>
             <a:fld id="{B2BAABBC-56DD-4B88-B4E3-B3ACA9437C8B}" type="datetimeFigureOut">
               <a:rPr lang="en-GB" smtClean="0"/>
-              <a:t>09/11/2025</a:t>
+              <a:t>11/11/2025</a:t>
             </a:fld>
             <a:endParaRPr lang="en-GB"/>
           </a:p>
@@ -878,7 +878,7 @@
           <a:p>
             <a:fld id="{1C5C65E5-6D6E-4608-862D-CBDC0ACF066B}" type="datetimeFigureOut">
               <a:rPr lang="en-GB" smtClean="0"/>
-              <a:t>09/11/2025</a:t>
+              <a:t>11/11/2025</a:t>
             </a:fld>
             <a:endParaRPr lang="en-GB"/>
           </a:p>
@@ -1176,7 +1176,7 @@
           <a:p>
             <a:fld id="{1C5C65E5-6D6E-4608-862D-CBDC0ACF066B}" type="datetimeFigureOut">
               <a:rPr lang="en-GB" smtClean="0"/>
-              <a:t>09/11/2025</a:t>
+              <a:t>11/11/2025</a:t>
             </a:fld>
             <a:endParaRPr lang="en-GB"/>
           </a:p>
@@ -1368,7 +1368,7 @@
           <a:p>
             <a:fld id="{1C5C65E5-6D6E-4608-862D-CBDC0ACF066B}" type="datetimeFigureOut">
               <a:rPr lang="en-GB" smtClean="0"/>
-              <a:t>09/11/2025</a:t>
+              <a:t>11/11/2025</a:t>
             </a:fld>
             <a:endParaRPr lang="en-GB"/>
           </a:p>
@@ -1629,7 +1629,7 @@
           <a:p>
             <a:fld id="{1C5C65E5-6D6E-4608-862D-CBDC0ACF066B}" type="datetimeFigureOut">
               <a:rPr lang="en-GB" smtClean="0"/>
-              <a:t>09/11/2025</a:t>
+              <a:t>11/11/2025</a:t>
             </a:fld>
             <a:endParaRPr lang="en-GB"/>
           </a:p>
@@ -2053,7 +2053,7 @@
           <a:p>
             <a:fld id="{1C5C65E5-6D6E-4608-862D-CBDC0ACF066B}" type="datetimeFigureOut">
               <a:rPr lang="en-GB" smtClean="0"/>
-              <a:t>09/11/2025</a:t>
+              <a:t>11/11/2025</a:t>
             </a:fld>
             <a:endParaRPr lang="en-GB"/>
           </a:p>
@@ -2590,7 +2590,7 @@
           <a:p>
             <a:fld id="{1C5C65E5-6D6E-4608-862D-CBDC0ACF066B}" type="datetimeFigureOut">
               <a:rPr lang="en-GB" smtClean="0"/>
-              <a:t>09/11/2025</a:t>
+              <a:t>11/11/2025</a:t>
             </a:fld>
             <a:endParaRPr lang="en-GB"/>
           </a:p>
@@ -3454,7 +3454,7 @@
           <a:p>
             <a:fld id="{1C5C65E5-6D6E-4608-862D-CBDC0ACF066B}" type="datetimeFigureOut">
               <a:rPr lang="en-GB" smtClean="0"/>
-              <a:t>09/11/2025</a:t>
+              <a:t>11/11/2025</a:t>
             </a:fld>
             <a:endParaRPr lang="en-GB"/>
           </a:p>
@@ -3624,7 +3624,7 @@
           <a:p>
             <a:fld id="{1C5C65E5-6D6E-4608-862D-CBDC0ACF066B}" type="datetimeFigureOut">
               <a:rPr lang="en-GB" smtClean="0"/>
-              <a:t>09/11/2025</a:t>
+              <a:t>11/11/2025</a:t>
             </a:fld>
             <a:endParaRPr lang="en-GB"/>
           </a:p>
@@ -3808,7 +3808,7 @@
           <a:p>
             <a:fld id="{1C5C65E5-6D6E-4608-862D-CBDC0ACF066B}" type="datetimeFigureOut">
               <a:rPr lang="en-GB" smtClean="0"/>
-              <a:t>09/11/2025</a:t>
+              <a:t>11/11/2025</a:t>
             </a:fld>
             <a:endParaRPr lang="en-GB"/>
           </a:p>
@@ -3978,7 +3978,7 @@
           <a:p>
             <a:fld id="{1C5C65E5-6D6E-4608-862D-CBDC0ACF066B}" type="datetimeFigureOut">
               <a:rPr lang="en-GB" smtClean="0"/>
-              <a:t>09/11/2025</a:t>
+              <a:t>11/11/2025</a:t>
             </a:fld>
             <a:endParaRPr lang="en-GB"/>
           </a:p>
@@ -4222,7 +4222,7 @@
           <a:p>
             <a:fld id="{1C5C65E5-6D6E-4608-862D-CBDC0ACF066B}" type="datetimeFigureOut">
               <a:rPr lang="en-GB" smtClean="0"/>
-              <a:t>09/11/2025</a:t>
+              <a:t>11/11/2025</a:t>
             </a:fld>
             <a:endParaRPr lang="en-GB"/>
           </a:p>
@@ -4458,7 +4458,7 @@
           <a:p>
             <a:fld id="{1C5C65E5-6D6E-4608-862D-CBDC0ACF066B}" type="datetimeFigureOut">
               <a:rPr lang="en-GB" smtClean="0"/>
-              <a:t>09/11/2025</a:t>
+              <a:t>11/11/2025</a:t>
             </a:fld>
             <a:endParaRPr lang="en-GB"/>
           </a:p>
@@ -4924,7 +4924,7 @@
           <a:p>
             <a:fld id="{1C5C65E5-6D6E-4608-862D-CBDC0ACF066B}" type="datetimeFigureOut">
               <a:rPr lang="en-GB" smtClean="0"/>
-              <a:t>09/11/2025</a:t>
+              <a:t>11/11/2025</a:t>
             </a:fld>
             <a:endParaRPr lang="en-GB"/>
           </a:p>
@@ -5042,7 +5042,7 @@
           <a:p>
             <a:fld id="{1C5C65E5-6D6E-4608-862D-CBDC0ACF066B}" type="datetimeFigureOut">
               <a:rPr lang="en-GB" smtClean="0"/>
-              <a:t>09/11/2025</a:t>
+              <a:t>11/11/2025</a:t>
             </a:fld>
             <a:endParaRPr lang="en-GB"/>
           </a:p>
@@ -5137,7 +5137,7 @@
           <a:p>
             <a:fld id="{1C5C65E5-6D6E-4608-862D-CBDC0ACF066B}" type="datetimeFigureOut">
               <a:rPr lang="en-GB" smtClean="0"/>
-              <a:t>09/11/2025</a:t>
+              <a:t>11/11/2025</a:t>
             </a:fld>
             <a:endParaRPr lang="en-GB"/>
           </a:p>
@@ -5392,7 +5392,7 @@
           <a:p>
             <a:fld id="{1C5C65E5-6D6E-4608-862D-CBDC0ACF066B}" type="datetimeFigureOut">
               <a:rPr lang="en-GB" smtClean="0"/>
-              <a:t>09/11/2025</a:t>
+              <a:t>11/11/2025</a:t>
             </a:fld>
             <a:endParaRPr lang="en-GB"/>
           </a:p>
@@ -5692,7 +5692,7 @@
           <a:p>
             <a:fld id="{1C5C65E5-6D6E-4608-862D-CBDC0ACF066B}" type="datetimeFigureOut">
               <a:rPr lang="en-GB" smtClean="0"/>
-              <a:t>09/11/2025</a:t>
+              <a:t>11/11/2025</a:t>
             </a:fld>
             <a:endParaRPr lang="en-GB"/>
           </a:p>
@@ -5926,7 +5926,7 @@
           <a:p>
             <a:fld id="{1C5C65E5-6D6E-4608-862D-CBDC0ACF066B}" type="datetimeFigureOut">
               <a:rPr lang="en-GB" smtClean="0"/>
-              <a:t>09/11/2025</a:t>
+              <a:t>11/11/2025</a:t>
             </a:fld>
             <a:endParaRPr lang="en-GB"/>
           </a:p>
@@ -7647,6 +7647,71 @@
           </a:fontRef>
         </p:style>
       </p:cxnSp>
+      <p:pic>
+        <p:nvPicPr>
+          <p:cNvPr id="3" name="Picture 2">
+            <a:extLst>
+              <a:ext uri="{FF2B5EF4-FFF2-40B4-BE49-F238E27FC236}">
+                <a16:creationId xmlns:a16="http://schemas.microsoft.com/office/drawing/2014/main" id="{08C505B2-527C-50FD-1C4A-9ECBD5FBA8DF}"/>
+              </a:ext>
+            </a:extLst>
+          </p:cNvPr>
+          <p:cNvPicPr>
+            <a:picLocks noChangeAspect="1"/>
+          </p:cNvPicPr>
+          <p:nvPr/>
+        </p:nvPicPr>
+        <p:blipFill>
+          <a:blip r:embed="rId3"/>
+          <a:stretch>
+            <a:fillRect/>
+          </a:stretch>
+        </p:blipFill>
+        <p:spPr>
+          <a:xfrm>
+            <a:off x="824415" y="2057399"/>
+            <a:ext cx="2715004" cy="2743583"/>
+          </a:xfrm>
+          <a:prstGeom prst="rect">
+            <a:avLst/>
+          </a:prstGeom>
+        </p:spPr>
+      </p:pic>
+      <p:sp>
+        <p:nvSpPr>
+          <p:cNvPr id="4" name="TextBox 3">
+            <a:extLst>
+              <a:ext uri="{FF2B5EF4-FFF2-40B4-BE49-F238E27FC236}">
+                <a16:creationId xmlns:a16="http://schemas.microsoft.com/office/drawing/2014/main" id="{8F88DC6D-B77D-CF50-3F1C-9004C88475DA}"/>
+              </a:ext>
+            </a:extLst>
+          </p:cNvPr>
+          <p:cNvSpPr txBox="1"/>
+          <p:nvPr/>
+        </p:nvSpPr>
+        <p:spPr>
+          <a:xfrm>
+            <a:off x="510694" y="5431756"/>
+            <a:ext cx="11986106" cy="584775"/>
+          </a:xfrm>
+          <a:prstGeom prst="rect">
+            <a:avLst/>
+          </a:prstGeom>
+          <a:noFill/>
+        </p:spPr>
+        <p:txBody>
+          <a:bodyPr wrap="square" rtlCol="0">
+            <a:spAutoFit/>
+          </a:bodyPr>
+          <a:lstStyle/>
+          <a:p>
+            <a:r>
+              <a:rPr lang="en-GB" sz="3200" dirty="0"/>
+              <a:t>https://jrw214.github.io/Website_Exposition_2025-jrw214-/#</a:t>
+            </a:r>
+          </a:p>
+        </p:txBody>
+      </p:sp>
     </p:spTree>
     <p:extLst>
       <p:ext uri="{BB962C8B-B14F-4D97-AF65-F5344CB8AC3E}">

</xml_diff>